<commit_message>
presentaion ppt final version
</commit_message>
<xml_diff>
--- a/midterm/期中報告_第32組.pptx
+++ b/midterm/期中報告_第32組.pptx
@@ -206,7 +206,7 @@
           <a:p>
             <a:fld id="{45B16B89-FD42-BE49-940C-D350179C7E51}" type="datetimeFigureOut">
               <a:rPr kumimoji="1" lang="zh-TW" altLang="en-US" smtClean="0"/>
-              <a:t>2021/5/3</a:t>
+              <a:t>2021/5/5</a:t>
             </a:fld>
             <a:endParaRPr kumimoji="1" lang="zh-TW" altLang="en-US"/>
           </a:p>
@@ -1157,7 +1157,7 @@
           <a:p>
             <a:fld id="{E63F89D2-1BC4-458E-BC9A-907AF60D8AF0}" type="datetimeFigureOut">
               <a:rPr lang="zh-TW" altLang="en-US" smtClean="0"/>
-              <a:t>2021/5/3</a:t>
+              <a:t>2021/5/5</a:t>
             </a:fld>
             <a:endParaRPr lang="zh-TW" altLang="en-US"/>
           </a:p>
@@ -1445,7 +1445,7 @@
           <a:p>
             <a:fld id="{E63F89D2-1BC4-458E-BC9A-907AF60D8AF0}" type="datetimeFigureOut">
               <a:rPr lang="zh-TW" altLang="en-US" smtClean="0"/>
-              <a:t>2021/5/3</a:t>
+              <a:t>2021/5/5</a:t>
             </a:fld>
             <a:endParaRPr lang="zh-TW" altLang="en-US"/>
           </a:p>
@@ -1643,7 +1643,7 @@
           <a:p>
             <a:fld id="{E63F89D2-1BC4-458E-BC9A-907AF60D8AF0}" type="datetimeFigureOut">
               <a:rPr lang="zh-TW" altLang="en-US" smtClean="0"/>
-              <a:t>2021/5/3</a:t>
+              <a:t>2021/5/5</a:t>
             </a:fld>
             <a:endParaRPr lang="zh-TW" altLang="en-US"/>
           </a:p>
@@ -1851,7 +1851,7 @@
           <a:p>
             <a:fld id="{E63F89D2-1BC4-458E-BC9A-907AF60D8AF0}" type="datetimeFigureOut">
               <a:rPr lang="zh-TW" altLang="en-US" smtClean="0"/>
-              <a:t>2021/5/3</a:t>
+              <a:t>2021/5/5</a:t>
             </a:fld>
             <a:endParaRPr lang="zh-TW" altLang="en-US"/>
           </a:p>
@@ -2131,7 +2131,7 @@
           <a:p>
             <a:fld id="{E63F89D2-1BC4-458E-BC9A-907AF60D8AF0}" type="datetimeFigureOut">
               <a:rPr lang="zh-TW" altLang="en-US" smtClean="0"/>
-              <a:t>2021/5/3</a:t>
+              <a:t>2021/5/5</a:t>
             </a:fld>
             <a:endParaRPr lang="zh-TW" altLang="en-US"/>
           </a:p>
@@ -2406,7 +2406,7 @@
           <a:p>
             <a:fld id="{E63F89D2-1BC4-458E-BC9A-907AF60D8AF0}" type="datetimeFigureOut">
               <a:rPr lang="zh-TW" altLang="en-US" smtClean="0"/>
-              <a:t>2021/5/3</a:t>
+              <a:t>2021/5/5</a:t>
             </a:fld>
             <a:endParaRPr lang="zh-TW" altLang="en-US"/>
           </a:p>
@@ -2671,7 +2671,7 @@
           <a:p>
             <a:fld id="{E63F89D2-1BC4-458E-BC9A-907AF60D8AF0}" type="datetimeFigureOut">
               <a:rPr lang="zh-TW" altLang="en-US" smtClean="0"/>
-              <a:t>2021/5/3</a:t>
+              <a:t>2021/5/5</a:t>
             </a:fld>
             <a:endParaRPr lang="zh-TW" altLang="en-US"/>
           </a:p>
@@ -3083,7 +3083,7 @@
           <a:p>
             <a:fld id="{E63F89D2-1BC4-458E-BC9A-907AF60D8AF0}" type="datetimeFigureOut">
               <a:rPr lang="zh-TW" altLang="en-US" smtClean="0"/>
-              <a:t>2021/5/3</a:t>
+              <a:t>2021/5/5</a:t>
             </a:fld>
             <a:endParaRPr lang="zh-TW" altLang="en-US"/>
           </a:p>
@@ -3224,7 +3224,7 @@
           <a:p>
             <a:fld id="{E63F89D2-1BC4-458E-BC9A-907AF60D8AF0}" type="datetimeFigureOut">
               <a:rPr lang="zh-TW" altLang="en-US" smtClean="0"/>
-              <a:t>2021/5/3</a:t>
+              <a:t>2021/5/5</a:t>
             </a:fld>
             <a:endParaRPr lang="zh-TW" altLang="en-US"/>
           </a:p>
@@ -3337,7 +3337,7 @@
           <a:p>
             <a:fld id="{E63F89D2-1BC4-458E-BC9A-907AF60D8AF0}" type="datetimeFigureOut">
               <a:rPr lang="zh-TW" altLang="en-US" smtClean="0"/>
-              <a:t>2021/5/3</a:t>
+              <a:t>2021/5/5</a:t>
             </a:fld>
             <a:endParaRPr lang="zh-TW" altLang="en-US"/>
           </a:p>
@@ -3648,7 +3648,7 @@
           <a:p>
             <a:fld id="{E63F89D2-1BC4-458E-BC9A-907AF60D8AF0}" type="datetimeFigureOut">
               <a:rPr lang="zh-TW" altLang="en-US" smtClean="0"/>
-              <a:t>2021/5/3</a:t>
+              <a:t>2021/5/5</a:t>
             </a:fld>
             <a:endParaRPr lang="zh-TW" altLang="en-US"/>
           </a:p>
@@ -3889,7 +3889,7 @@
           <a:p>
             <a:fld id="{E63F89D2-1BC4-458E-BC9A-907AF60D8AF0}" type="datetimeFigureOut">
               <a:rPr lang="zh-TW" altLang="en-US" smtClean="0"/>
-              <a:t>2021/5/3</a:t>
+              <a:t>2021/5/5</a:t>
             </a:fld>
             <a:endParaRPr lang="zh-TW" altLang="en-US"/>
           </a:p>
@@ -4742,8 +4742,8 @@
         </p:nvSpPr>
         <p:spPr>
           <a:xfrm>
-            <a:off x="838200" y="1443028"/>
-            <a:ext cx="10515600" cy="5386090"/>
+            <a:off x="838200" y="1933680"/>
+            <a:ext cx="10515600" cy="4462760"/>
           </a:xfrm>
           <a:prstGeom prst="rect">
             <a:avLst/>
@@ -5116,89 +5116,6 @@
               <a:t>為佳）</a:t>
             </a:r>
             <a:endParaRPr lang="en-US" altLang="zh-TW" sz="2000" dirty="0">
-              <a:solidFill>
-                <a:schemeClr val="bg1"/>
-              </a:solidFill>
-              <a:latin typeface="微軟正黑體" panose="020B0604030504040204" pitchFamily="34" charset="-120"/>
-              <a:ea typeface="微軟正黑體" panose="020B0604030504040204" pitchFamily="34" charset="-120"/>
-            </a:endParaRPr>
-          </a:p>
-          <a:p>
-            <a:pPr marL="914400" lvl="1" indent="-457200">
-              <a:buFont typeface="Arial" panose="020B0604020202020204" pitchFamily="34" charset="0"/>
-              <a:buChar char="•"/>
-            </a:pPr>
-            <a:r>
-              <a:rPr lang="en" altLang="zh-TW" sz="2400" dirty="0">
-                <a:solidFill>
-                  <a:schemeClr val="bg1"/>
-                </a:solidFill>
-                <a:latin typeface="微軟正黑體" panose="020B0604030504040204" pitchFamily="34" charset="-120"/>
-                <a:ea typeface="微軟正黑體" panose="020B0604030504040204" pitchFamily="34" charset="-120"/>
-              </a:rPr>
-              <a:t>variance </a:t>
-            </a:r>
-            <a:r>
-              <a:rPr lang="zh-TW" altLang="en-US" sz="2400" dirty="0">
-                <a:solidFill>
-                  <a:schemeClr val="bg1"/>
-                </a:solidFill>
-                <a:latin typeface="微軟正黑體" panose="020B0604030504040204" pitchFamily="34" charset="-120"/>
-                <a:ea typeface="微軟正黑體" panose="020B0604030504040204" pitchFamily="34" charset="-120"/>
-              </a:rPr>
-              <a:t>回傳觀察值與中心點、</a:t>
-            </a:r>
-            <a:r>
-              <a:rPr lang="en" altLang="zh-TW" sz="2400" dirty="0">
-                <a:solidFill>
-                  <a:schemeClr val="bg1"/>
-                </a:solidFill>
-                <a:latin typeface="微軟正黑體" panose="020B0604030504040204" pitchFamily="34" charset="-120"/>
-                <a:ea typeface="微軟正黑體" panose="020B0604030504040204" pitchFamily="34" charset="-120"/>
-              </a:rPr>
-              <a:t> distance </a:t>
-            </a:r>
-            <a:r>
-              <a:rPr lang="zh-TW" altLang="en-US" sz="2400" dirty="0">
-                <a:solidFill>
-                  <a:schemeClr val="bg1"/>
-                </a:solidFill>
-                <a:latin typeface="微軟正黑體" panose="020B0604030504040204" pitchFamily="34" charset="-120"/>
-                <a:ea typeface="微軟正黑體" panose="020B0604030504040204" pitchFamily="34" charset="-120"/>
-              </a:rPr>
-              <a:t>觀察值與中心點的距離，可能會有失真問題</a:t>
-            </a:r>
-            <a:r>
-              <a:rPr lang="zh-TW" altLang="en-US" sz="2000" dirty="0">
-                <a:solidFill>
-                  <a:schemeClr val="bg1"/>
-                </a:solidFill>
-                <a:latin typeface="微軟正黑體" panose="020B0604030504040204" pitchFamily="34" charset="-120"/>
-                <a:ea typeface="微軟正黑體" panose="020B0604030504040204" pitchFamily="34" charset="-120"/>
-              </a:rPr>
-              <a:t>（使用 </a:t>
-            </a:r>
-            <a:r>
-              <a:rPr lang="en" altLang="zh-TW" sz="2000" dirty="0">
-                <a:solidFill>
-                  <a:schemeClr val="bg1"/>
-                </a:solidFill>
-                <a:latin typeface="微軟正黑體" panose="020B0604030504040204" pitchFamily="34" charset="-120"/>
-                <a:ea typeface="微軟正黑體" panose="020B0604030504040204" pitchFamily="34" charset="-120"/>
-              </a:rPr>
-              <a:t>kmeans2 </a:t>
-            </a:r>
-            <a:r>
-              <a:rPr lang="zh-TW" altLang="en-US" sz="2000" dirty="0">
-                <a:solidFill>
-                  <a:schemeClr val="bg1"/>
-                </a:solidFill>
-                <a:latin typeface="微軟正黑體" panose="020B0604030504040204" pitchFamily="34" charset="-120"/>
-                <a:ea typeface="微軟正黑體" panose="020B0604030504040204" pitchFamily="34" charset="-120"/>
-              </a:rPr>
-              <a:t>方法）</a:t>
-            </a:r>
-            <a:endParaRPr lang="zh-TW" altLang="en-US" sz="2400" dirty="0">
               <a:solidFill>
                 <a:schemeClr val="bg1"/>
               </a:solidFill>
@@ -6723,7 +6640,47 @@
                 <a:latin typeface="微軟正黑體" panose="020B0604030504040204" pitchFamily="34" charset="-120"/>
                 <a:ea typeface="微軟正黑體" panose="020B0604030504040204" pitchFamily="34" charset="-120"/>
               </a:rPr>
-              <a:t>對光影、旋轉的判別較為寬鬆，所以可能反而容易三種都被視為一樣的手勢。而且因為</a:t>
+              <a:t>加入了光影、旋轉</a:t>
+            </a:r>
+            <a:r>
+              <a:rPr lang="en-US" altLang="zh-TW" sz="2800" dirty="0">
+                <a:solidFill>
+                  <a:schemeClr val="bg1"/>
+                </a:solidFill>
+                <a:latin typeface="微軟正黑體" panose="020B0604030504040204" pitchFamily="34" charset="-120"/>
+                <a:ea typeface="微軟正黑體" panose="020B0604030504040204" pitchFamily="34" charset="-120"/>
+              </a:rPr>
+              <a:t>..</a:t>
+            </a:r>
+            <a:r>
+              <a:rPr lang="zh-TW" altLang="en-US" sz="2800" dirty="0">
+                <a:solidFill>
+                  <a:schemeClr val="bg1"/>
+                </a:solidFill>
+                <a:latin typeface="微軟正黑體" panose="020B0604030504040204" pitchFamily="34" charset="-120"/>
+                <a:ea typeface="微軟正黑體" panose="020B0604030504040204" pitchFamily="34" charset="-120"/>
+              </a:rPr>
+              <a:t>等辨識元素，在不同手勢但光影類似的情況下，誤判為同一種的機率</a:t>
+            </a:r>
+            <a:r>
+              <a:rPr lang="zh-TW" altLang="en-US" sz="2800">
+                <a:solidFill>
+                  <a:schemeClr val="bg1"/>
+                </a:solidFill>
+                <a:latin typeface="微軟正黑體" panose="020B0604030504040204" pitchFamily="34" charset="-120"/>
+                <a:ea typeface="微軟正黑體" panose="020B0604030504040204" pitchFamily="34" charset="-120"/>
+              </a:rPr>
+              <a:t>就高；而且</a:t>
+            </a:r>
+            <a:r>
+              <a:rPr lang="zh-TW" altLang="en-US" sz="2800" dirty="0">
+                <a:solidFill>
+                  <a:schemeClr val="bg1"/>
+                </a:solidFill>
+                <a:latin typeface="微軟正黑體" panose="020B0604030504040204" pitchFamily="34" charset="-120"/>
+                <a:ea typeface="微軟正黑體" panose="020B0604030504040204" pitchFamily="34" charset="-120"/>
+              </a:rPr>
+              <a:t>因為</a:t>
             </a:r>
             <a:r>
               <a:rPr lang="en-US" altLang="zh-TW" sz="2800" dirty="0">

</xml_diff>